<commit_message>
Update to overleaf version
</commit_message>
<xml_diff>
--- a/yfcc100m/paper/vldb2020/figures/video_overhead.pptx
+++ b/yfcc100m/paper/vldb2020/figures/video_overhead.pptx
@@ -107,6 +107,11 @@
       </a:defRPr>
     </a:lvl9pPr>
   </p:defaultTextStyle>
+  <p:extLst>
+    <p:ext uri="{EFAFB233-063F-42B5-8137-9DF3F51BA10A}">
+      <p15:sldGuideLst xmlns:p15="http://schemas.microsoft.com/office/powerpoint/2012/main"/>
+    </p:ext>
+  </p:extLst>
 </p:presentation>
 </file>
 
@@ -192,7 +197,7 @@
           <a:p>
             <a:fld id="{A42096A0-AD15-ED4C-80D9-A6A18CB8636E}" type="datetimeFigureOut">
               <a:rPr lang="en-US" smtClean="0"/>
-              <a:t>1/14/20</a:t>
+              <a:t>2/24/20</a:t>
             </a:fld>
             <a:endParaRPr lang="en-US"/>
           </a:p>
@@ -692,7 +697,7 @@
           <a:p>
             <a:fld id="{6085EDAB-63A6-CE43-BC1A-54F1B163B389}" type="datetimeFigureOut">
               <a:rPr lang="en-US" smtClean="0"/>
-              <a:t>1/14/20</a:t>
+              <a:t>2/24/20</a:t>
             </a:fld>
             <a:endParaRPr lang="en-US"/>
           </a:p>
@@ -862,7 +867,7 @@
           <a:p>
             <a:fld id="{6085EDAB-63A6-CE43-BC1A-54F1B163B389}" type="datetimeFigureOut">
               <a:rPr lang="en-US" smtClean="0"/>
-              <a:t>1/14/20</a:t>
+              <a:t>2/24/20</a:t>
             </a:fld>
             <a:endParaRPr lang="en-US"/>
           </a:p>
@@ -1042,7 +1047,7 @@
           <a:p>
             <a:fld id="{6085EDAB-63A6-CE43-BC1A-54F1B163B389}" type="datetimeFigureOut">
               <a:rPr lang="en-US" smtClean="0"/>
-              <a:t>1/14/20</a:t>
+              <a:t>2/24/20</a:t>
             </a:fld>
             <a:endParaRPr lang="en-US"/>
           </a:p>
@@ -1212,7 +1217,7 @@
           <a:p>
             <a:fld id="{6085EDAB-63A6-CE43-BC1A-54F1B163B389}" type="datetimeFigureOut">
               <a:rPr lang="en-US" smtClean="0"/>
-              <a:t>1/14/20</a:t>
+              <a:t>2/24/20</a:t>
             </a:fld>
             <a:endParaRPr lang="en-US"/>
           </a:p>
@@ -1458,7 +1463,7 @@
           <a:p>
             <a:fld id="{6085EDAB-63A6-CE43-BC1A-54F1B163B389}" type="datetimeFigureOut">
               <a:rPr lang="en-US" smtClean="0"/>
-              <a:t>1/14/20</a:t>
+              <a:t>2/24/20</a:t>
             </a:fld>
             <a:endParaRPr lang="en-US"/>
           </a:p>
@@ -1690,7 +1695,7 @@
           <a:p>
             <a:fld id="{6085EDAB-63A6-CE43-BC1A-54F1B163B389}" type="datetimeFigureOut">
               <a:rPr lang="en-US" smtClean="0"/>
-              <a:t>1/14/20</a:t>
+              <a:t>2/24/20</a:t>
             </a:fld>
             <a:endParaRPr lang="en-US"/>
           </a:p>
@@ -2057,7 +2062,7 @@
           <a:p>
             <a:fld id="{6085EDAB-63A6-CE43-BC1A-54F1B163B389}" type="datetimeFigureOut">
               <a:rPr lang="en-US" smtClean="0"/>
-              <a:t>1/14/20</a:t>
+              <a:t>2/24/20</a:t>
             </a:fld>
             <a:endParaRPr lang="en-US"/>
           </a:p>
@@ -2175,7 +2180,7 @@
           <a:p>
             <a:fld id="{6085EDAB-63A6-CE43-BC1A-54F1B163B389}" type="datetimeFigureOut">
               <a:rPr lang="en-US" smtClean="0"/>
-              <a:t>1/14/20</a:t>
+              <a:t>2/24/20</a:t>
             </a:fld>
             <a:endParaRPr lang="en-US"/>
           </a:p>
@@ -2270,7 +2275,7 @@
           <a:p>
             <a:fld id="{6085EDAB-63A6-CE43-BC1A-54F1B163B389}" type="datetimeFigureOut">
               <a:rPr lang="en-US" smtClean="0"/>
-              <a:t>1/14/20</a:t>
+              <a:t>2/24/20</a:t>
             </a:fld>
             <a:endParaRPr lang="en-US"/>
           </a:p>
@@ -2547,7 +2552,7 @@
           <a:p>
             <a:fld id="{6085EDAB-63A6-CE43-BC1A-54F1B163B389}" type="datetimeFigureOut">
               <a:rPr lang="en-US" smtClean="0"/>
-              <a:t>1/14/20</a:t>
+              <a:t>2/24/20</a:t>
             </a:fld>
             <a:endParaRPr lang="en-US"/>
           </a:p>
@@ -2804,7 +2809,7 @@
           <a:p>
             <a:fld id="{6085EDAB-63A6-CE43-BC1A-54F1B163B389}" type="datetimeFigureOut">
               <a:rPr lang="en-US" smtClean="0"/>
-              <a:t>1/14/20</a:t>
+              <a:t>2/24/20</a:t>
             </a:fld>
             <a:endParaRPr lang="en-US"/>
           </a:p>
@@ -3017,7 +3022,7 @@
           <a:p>
             <a:fld id="{6085EDAB-63A6-CE43-BC1A-54F1B163B389}" type="datetimeFigureOut">
               <a:rPr lang="en-US" smtClean="0"/>
-              <a:t>1/14/20</a:t>
+              <a:t>2/24/20</a:t>
             </a:fld>
             <a:endParaRPr lang="en-US"/>
           </a:p>
@@ -3654,6 +3659,119 @@
           </a:p>
           <a:p>
             <a:endParaRPr lang="en-US" sz="1200" dirty="0"/>
+          </a:p>
+        </p:txBody>
+      </p:sp>
+      <p:sp>
+        <p:nvSpPr>
+          <p:cNvPr id="2" name="TextBox 1">
+            <a:extLst>
+              <a:ext uri="{FF2B5EF4-FFF2-40B4-BE49-F238E27FC236}">
+                <a16:creationId xmlns:a16="http://schemas.microsoft.com/office/drawing/2014/main" id="{AE114E74-36A1-3E4D-9A34-781116963DDB}"/>
+              </a:ext>
+            </a:extLst>
+          </p:cNvPr>
+          <p:cNvSpPr txBox="1"/>
+          <p:nvPr/>
+        </p:nvSpPr>
+        <p:spPr>
+          <a:xfrm rot="16200000">
+            <a:off x="-353406" y="2206454"/>
+            <a:ext cx="1219200" cy="338554"/>
+          </a:xfrm>
+          <a:prstGeom prst="rect">
+            <a:avLst/>
+          </a:prstGeom>
+          <a:solidFill>
+            <a:schemeClr val="bg1"/>
+          </a:solidFill>
+        </p:spPr>
+        <p:txBody>
+          <a:bodyPr wrap="square" rtlCol="0">
+            <a:spAutoFit/>
+          </a:bodyPr>
+          <a:lstStyle/>
+          <a:p>
+            <a:r>
+              <a:rPr lang="en-US" sz="1600" dirty="0"/>
+              <a:t>Videos/sec</a:t>
+            </a:r>
+          </a:p>
+        </p:txBody>
+      </p:sp>
+      <p:sp>
+        <p:nvSpPr>
+          <p:cNvPr id="12" name="TextBox 11">
+            <a:extLst>
+              <a:ext uri="{FF2B5EF4-FFF2-40B4-BE49-F238E27FC236}">
+                <a16:creationId xmlns:a16="http://schemas.microsoft.com/office/drawing/2014/main" id="{3AA1AC16-A2B5-5342-98FA-7D57F6B9F8EE}"/>
+              </a:ext>
+            </a:extLst>
+          </p:cNvPr>
+          <p:cNvSpPr txBox="1"/>
+          <p:nvPr/>
+        </p:nvSpPr>
+        <p:spPr>
+          <a:xfrm>
+            <a:off x="1103587" y="212648"/>
+            <a:ext cx="4235668" cy="338554"/>
+          </a:xfrm>
+          <a:prstGeom prst="rect">
+            <a:avLst/>
+          </a:prstGeom>
+          <a:solidFill>
+            <a:schemeClr val="bg1"/>
+          </a:solidFill>
+        </p:spPr>
+        <p:txBody>
+          <a:bodyPr wrap="square" rtlCol="0">
+            <a:spAutoFit/>
+          </a:bodyPr>
+          <a:lstStyle/>
+          <a:p>
+            <a:pPr algn="ctr"/>
+            <a:r>
+              <a:rPr lang="en-US" sz="1600" dirty="0"/>
+              <a:t>VDMS – Concurrent Video Operations</a:t>
+            </a:r>
+          </a:p>
+        </p:txBody>
+      </p:sp>
+      <p:sp>
+        <p:nvSpPr>
+          <p:cNvPr id="13" name="TextBox 12">
+            <a:extLst>
+              <a:ext uri="{FF2B5EF4-FFF2-40B4-BE49-F238E27FC236}">
+                <a16:creationId xmlns:a16="http://schemas.microsoft.com/office/drawing/2014/main" id="{C4DA2CE3-6D91-EE46-8E74-375FD457333D}"/>
+              </a:ext>
+            </a:extLst>
+          </p:cNvPr>
+          <p:cNvSpPr txBox="1"/>
+          <p:nvPr/>
+        </p:nvSpPr>
+        <p:spPr>
+          <a:xfrm>
+            <a:off x="6916787" y="212648"/>
+            <a:ext cx="4235668" cy="338554"/>
+          </a:xfrm>
+          <a:prstGeom prst="rect">
+            <a:avLst/>
+          </a:prstGeom>
+          <a:solidFill>
+            <a:schemeClr val="bg1"/>
+          </a:solidFill>
+        </p:spPr>
+        <p:txBody>
+          <a:bodyPr wrap="square" rtlCol="0">
+            <a:spAutoFit/>
+          </a:bodyPr>
+          <a:lstStyle/>
+          <a:p>
+            <a:pPr algn="ctr"/>
+            <a:r>
+              <a:rPr lang="en-US" sz="1600" dirty="0"/>
+              <a:t>Video Operations in VDMS – 32 Clients</a:t>
+            </a:r>
           </a:p>
         </p:txBody>
       </p:sp>

</xml_diff>